<commit_message>
Atualizações do site, slide e doc
</commit_message>
<xml_diff>
--- a/Slide/Slides Academia Slow.pptx
+++ b/Slide/Slides Academia Slow.pptx
@@ -5,7 +5,7 @@
     <p:sldMasterId id="2147483676" r:id="rId1"/>
   </p:sldMasterIdLst>
   <p:notesMasterIdLst>
-    <p:notesMasterId r:id="rId14"/>
+    <p:notesMasterId r:id="rId18"/>
   </p:notesMasterIdLst>
   <p:sldIdLst>
     <p:sldId id="256" r:id="rId2"/>
@@ -16,43 +16,47 @@
     <p:sldId id="260" r:id="rId7"/>
     <p:sldId id="305" r:id="rId8"/>
     <p:sldId id="306" r:id="rId9"/>
-    <p:sldId id="313" r:id="rId10"/>
-    <p:sldId id="312" r:id="rId11"/>
-    <p:sldId id="258" r:id="rId12"/>
-    <p:sldId id="311" r:id="rId13"/>
+    <p:sldId id="317" r:id="rId10"/>
+    <p:sldId id="314" r:id="rId11"/>
+    <p:sldId id="316" r:id="rId12"/>
+    <p:sldId id="313" r:id="rId13"/>
+    <p:sldId id="312" r:id="rId14"/>
+    <p:sldId id="258" r:id="rId15"/>
+    <p:sldId id="315" r:id="rId16"/>
+    <p:sldId id="311" r:id="rId17"/>
   </p:sldIdLst>
   <p:sldSz cx="9144000" cy="5143500" type="screen16x9"/>
   <p:notesSz cx="6858000" cy="9144000"/>
   <p:embeddedFontLst>
     <p:embeddedFont>
       <p:font typeface="Brush Script MT" panose="03060802040406070304" pitchFamily="66" charset="0"/>
-      <p:italic r:id="rId15"/>
+      <p:italic r:id="rId19"/>
     </p:embeddedFont>
     <p:embeddedFont>
       <p:font typeface="Calibri" panose="020F0502020204030204" pitchFamily="34" charset="0"/>
-      <p:regular r:id="rId16"/>
-      <p:bold r:id="rId17"/>
-      <p:italic r:id="rId18"/>
-      <p:boldItalic r:id="rId19"/>
+      <p:regular r:id="rId20"/>
+      <p:bold r:id="rId21"/>
+      <p:italic r:id="rId22"/>
+      <p:boldItalic r:id="rId23"/>
     </p:embeddedFont>
     <p:embeddedFont>
       <p:font typeface="Nunito Sans Black" pitchFamily="2" charset="0"/>
-      <p:bold r:id="rId20"/>
-      <p:boldItalic r:id="rId21"/>
+      <p:bold r:id="rId24"/>
+      <p:boldItalic r:id="rId25"/>
     </p:embeddedFont>
     <p:embeddedFont>
       <p:font typeface="Nunito Sans ExtraBold" pitchFamily="2" charset="0"/>
-      <p:bold r:id="rId22"/>
-      <p:boldItalic r:id="rId23"/>
+      <p:bold r:id="rId26"/>
+      <p:boldItalic r:id="rId27"/>
     </p:embeddedFont>
     <p:embeddedFont>
       <p:font typeface="Roboto Slab Light" panose="020B0604020202020204" charset="0"/>
-      <p:regular r:id="rId24"/>
-      <p:bold r:id="rId25"/>
+      <p:regular r:id="rId28"/>
+      <p:bold r:id="rId29"/>
     </p:embeddedFont>
     <p:embeddedFont>
       <p:font typeface="Squada One" panose="020B0604020202020204" charset="0"/>
-      <p:regular r:id="rId26"/>
+      <p:regular r:id="rId30"/>
     </p:embeddedFont>
   </p:embeddedFontLst>
   <p:defaultTextStyle>
@@ -1594,6 +1598,333 @@
   <p:cSld>
     <p:spTree>
       <p:nvGrpSpPr>
+        <p:cNvPr id="1" name="Shape 344"/>
+        <p:cNvGrpSpPr/>
+        <p:nvPr/>
+      </p:nvGrpSpPr>
+      <p:grpSpPr>
+        <a:xfrm>
+          <a:off x="0" y="0"/>
+          <a:ext cx="0" cy="0"/>
+          <a:chOff x="0" y="0"/>
+          <a:chExt cx="0" cy="0"/>
+        </a:xfrm>
+      </p:grpSpPr>
+      <p:sp>
+        <p:nvSpPr>
+          <p:cNvPr id="345" name="Google Shape;345;p4:notes"/>
+          <p:cNvSpPr txBox="1">
+            <a:spLocks noGrp="1"/>
+          </p:cNvSpPr>
+          <p:nvPr>
+            <p:ph type="body" idx="1"/>
+          </p:nvPr>
+        </p:nvSpPr>
+        <p:spPr>
+          <a:xfrm>
+            <a:off x="685800" y="4400550"/>
+            <a:ext cx="5486400" cy="3600450"/>
+          </a:xfrm>
+          <a:prstGeom prst="rect">
+            <a:avLst/>
+          </a:prstGeom>
+        </p:spPr>
+        <p:txBody>
+          <a:bodyPr spcFirstLastPara="1" wrap="square" lIns="91425" tIns="45700" rIns="91425" bIns="45700" anchor="t" anchorCtr="0">
+            <a:noAutofit/>
+          </a:bodyPr>
+          <a:lstStyle/>
+          <a:p>
+            <a:pPr marL="0" lvl="0" indent="0" algn="l" rtl="0">
+              <a:spcBef>
+                <a:spcPts val="0"/>
+              </a:spcBef>
+              <a:spcAft>
+                <a:spcPts val="0"/>
+              </a:spcAft>
+              <a:buNone/>
+            </a:pPr>
+            <a:endParaRPr/>
+          </a:p>
+        </p:txBody>
+      </p:sp>
+      <p:sp>
+        <p:nvSpPr>
+          <p:cNvPr id="346" name="Google Shape;346;p4:notes"/>
+          <p:cNvSpPr>
+            <a:spLocks noGrp="1" noRot="1" noChangeAspect="1"/>
+          </p:cNvSpPr>
+          <p:nvPr>
+            <p:ph type="sldImg" idx="2"/>
+          </p:nvPr>
+        </p:nvSpPr>
+        <p:spPr>
+          <a:xfrm>
+            <a:off x="685800" y="1143000"/>
+            <a:ext cx="5486400" cy="3086100"/>
+          </a:xfrm>
+          <a:custGeom>
+            <a:avLst/>
+            <a:gdLst/>
+            <a:ahLst/>
+            <a:cxnLst/>
+            <a:rect l="l" t="t" r="r" b="b"/>
+            <a:pathLst>
+              <a:path w="120000" h="120000" extrusionOk="0">
+                <a:moveTo>
+                  <a:pt x="0" y="0"/>
+                </a:moveTo>
+                <a:lnTo>
+                  <a:pt x="120000" y="0"/>
+                </a:lnTo>
+                <a:lnTo>
+                  <a:pt x="120000" y="120000"/>
+                </a:lnTo>
+                <a:lnTo>
+                  <a:pt x="0" y="120000"/>
+                </a:lnTo>
+                <a:close/>
+              </a:path>
+            </a:pathLst>
+          </a:custGeom>
+        </p:spPr>
+      </p:sp>
+    </p:spTree>
+    <p:extLst>
+      <p:ext uri="{BB962C8B-B14F-4D97-AF65-F5344CB8AC3E}">
+        <p14:creationId xmlns:p14="http://schemas.microsoft.com/office/powerpoint/2010/main" val="4021872015"/>
+      </p:ext>
+    </p:extLst>
+  </p:cSld>
+  <p:clrMapOvr>
+    <a:masterClrMapping/>
+  </p:clrMapOvr>
+</p:notes>
+</file>
+
+<file path=ppt/notesSlides/notesSlide11.xml><?xml version="1.0" encoding="utf-8"?>
+<p:notes xmlns:a="http://schemas.openxmlformats.org/drawingml/2006/main" xmlns:r="http://schemas.openxmlformats.org/officeDocument/2006/relationships" xmlns:p="http://schemas.openxmlformats.org/presentationml/2006/main" showMasterSp="0" showMasterPhAnim="0">
+  <p:cSld>
+    <p:spTree>
+      <p:nvGrpSpPr>
+        <p:cNvPr id="1" name="Shape 321"/>
+        <p:cNvGrpSpPr/>
+        <p:nvPr/>
+      </p:nvGrpSpPr>
+      <p:grpSpPr>
+        <a:xfrm>
+          <a:off x="0" y="0"/>
+          <a:ext cx="0" cy="0"/>
+          <a:chOff x="0" y="0"/>
+          <a:chExt cx="0" cy="0"/>
+        </a:xfrm>
+      </p:grpSpPr>
+      <p:sp>
+        <p:nvSpPr>
+          <p:cNvPr id="322" name="Google Shape;322;p2:notes"/>
+          <p:cNvSpPr txBox="1">
+            <a:spLocks noGrp="1"/>
+          </p:cNvSpPr>
+          <p:nvPr>
+            <p:ph type="body" idx="1"/>
+          </p:nvPr>
+        </p:nvSpPr>
+        <p:spPr>
+          <a:xfrm>
+            <a:off x="685800" y="4400550"/>
+            <a:ext cx="5486400" cy="3600450"/>
+          </a:xfrm>
+          <a:prstGeom prst="rect">
+            <a:avLst/>
+          </a:prstGeom>
+        </p:spPr>
+        <p:txBody>
+          <a:bodyPr spcFirstLastPara="1" wrap="square" lIns="91425" tIns="45700" rIns="91425" bIns="45700" anchor="t" anchorCtr="0">
+            <a:noAutofit/>
+          </a:bodyPr>
+          <a:lstStyle/>
+          <a:p>
+            <a:pPr marL="0" lvl="0" indent="0" algn="l" rtl="0">
+              <a:spcBef>
+                <a:spcPts val="0"/>
+              </a:spcBef>
+              <a:spcAft>
+                <a:spcPts val="0"/>
+              </a:spcAft>
+              <a:buNone/>
+            </a:pPr>
+            <a:endParaRPr/>
+          </a:p>
+        </p:txBody>
+      </p:sp>
+      <p:sp>
+        <p:nvSpPr>
+          <p:cNvPr id="323" name="Google Shape;323;p2:notes"/>
+          <p:cNvSpPr>
+            <a:spLocks noGrp="1" noRot="1" noChangeAspect="1"/>
+          </p:cNvSpPr>
+          <p:nvPr>
+            <p:ph type="sldImg" idx="2"/>
+          </p:nvPr>
+        </p:nvSpPr>
+        <p:spPr>
+          <a:xfrm>
+            <a:off x="685800" y="1143000"/>
+            <a:ext cx="5486400" cy="3086100"/>
+          </a:xfrm>
+          <a:custGeom>
+            <a:avLst/>
+            <a:gdLst/>
+            <a:ahLst/>
+            <a:cxnLst/>
+            <a:rect l="l" t="t" r="r" b="b"/>
+            <a:pathLst>
+              <a:path w="120000" h="120000" extrusionOk="0">
+                <a:moveTo>
+                  <a:pt x="0" y="0"/>
+                </a:moveTo>
+                <a:lnTo>
+                  <a:pt x="120000" y="0"/>
+                </a:lnTo>
+                <a:lnTo>
+                  <a:pt x="120000" y="120000"/>
+                </a:lnTo>
+                <a:lnTo>
+                  <a:pt x="0" y="120000"/>
+                </a:lnTo>
+                <a:close/>
+              </a:path>
+            </a:pathLst>
+          </a:custGeom>
+        </p:spPr>
+      </p:sp>
+    </p:spTree>
+    <p:extLst>
+      <p:ext uri="{BB962C8B-B14F-4D97-AF65-F5344CB8AC3E}">
+        <p14:creationId xmlns:p14="http://schemas.microsoft.com/office/powerpoint/2010/main" val="3707752046"/>
+      </p:ext>
+    </p:extLst>
+  </p:cSld>
+  <p:clrMapOvr>
+    <a:masterClrMapping/>
+  </p:clrMapOvr>
+</p:notes>
+</file>
+
+<file path=ppt/notesSlides/notesSlide12.xml><?xml version="1.0" encoding="utf-8"?>
+<p:notes xmlns:a="http://schemas.openxmlformats.org/drawingml/2006/main" xmlns:r="http://schemas.openxmlformats.org/officeDocument/2006/relationships" xmlns:p="http://schemas.openxmlformats.org/presentationml/2006/main" showMasterSp="0" showMasterPhAnim="0">
+  <p:cSld>
+    <p:spTree>
+      <p:nvGrpSpPr>
+        <p:cNvPr id="1" name="Shape 321"/>
+        <p:cNvGrpSpPr/>
+        <p:nvPr/>
+      </p:nvGrpSpPr>
+      <p:grpSpPr>
+        <a:xfrm>
+          <a:off x="0" y="0"/>
+          <a:ext cx="0" cy="0"/>
+          <a:chOff x="0" y="0"/>
+          <a:chExt cx="0" cy="0"/>
+        </a:xfrm>
+      </p:grpSpPr>
+      <p:sp>
+        <p:nvSpPr>
+          <p:cNvPr id="322" name="Google Shape;322;p2:notes"/>
+          <p:cNvSpPr txBox="1">
+            <a:spLocks noGrp="1"/>
+          </p:cNvSpPr>
+          <p:nvPr>
+            <p:ph type="body" idx="1"/>
+          </p:nvPr>
+        </p:nvSpPr>
+        <p:spPr>
+          <a:xfrm>
+            <a:off x="685800" y="4400550"/>
+            <a:ext cx="5486400" cy="3600450"/>
+          </a:xfrm>
+          <a:prstGeom prst="rect">
+            <a:avLst/>
+          </a:prstGeom>
+        </p:spPr>
+        <p:txBody>
+          <a:bodyPr spcFirstLastPara="1" wrap="square" lIns="91425" tIns="45700" rIns="91425" bIns="45700" anchor="t" anchorCtr="0">
+            <a:noAutofit/>
+          </a:bodyPr>
+          <a:lstStyle/>
+          <a:p>
+            <a:pPr marL="0" lvl="0" indent="0" algn="l" rtl="0">
+              <a:spcBef>
+                <a:spcPts val="0"/>
+              </a:spcBef>
+              <a:spcAft>
+                <a:spcPts val="0"/>
+              </a:spcAft>
+              <a:buNone/>
+            </a:pPr>
+            <a:endParaRPr/>
+          </a:p>
+        </p:txBody>
+      </p:sp>
+      <p:sp>
+        <p:nvSpPr>
+          <p:cNvPr id="323" name="Google Shape;323;p2:notes"/>
+          <p:cNvSpPr>
+            <a:spLocks noGrp="1" noRot="1" noChangeAspect="1"/>
+          </p:cNvSpPr>
+          <p:nvPr>
+            <p:ph type="sldImg" idx="2"/>
+          </p:nvPr>
+        </p:nvSpPr>
+        <p:spPr>
+          <a:xfrm>
+            <a:off x="685800" y="1143000"/>
+            <a:ext cx="5486400" cy="3086100"/>
+          </a:xfrm>
+          <a:custGeom>
+            <a:avLst/>
+            <a:gdLst/>
+            <a:ahLst/>
+            <a:cxnLst/>
+            <a:rect l="l" t="t" r="r" b="b"/>
+            <a:pathLst>
+              <a:path w="120000" h="120000" extrusionOk="0">
+                <a:moveTo>
+                  <a:pt x="0" y="0"/>
+                </a:moveTo>
+                <a:lnTo>
+                  <a:pt x="120000" y="0"/>
+                </a:lnTo>
+                <a:lnTo>
+                  <a:pt x="120000" y="120000"/>
+                </a:lnTo>
+                <a:lnTo>
+                  <a:pt x="0" y="120000"/>
+                </a:lnTo>
+                <a:close/>
+              </a:path>
+            </a:pathLst>
+          </a:custGeom>
+        </p:spPr>
+      </p:sp>
+    </p:spTree>
+    <p:extLst>
+      <p:ext uri="{BB962C8B-B14F-4D97-AF65-F5344CB8AC3E}">
+        <p14:creationId xmlns:p14="http://schemas.microsoft.com/office/powerpoint/2010/main" val="1248237262"/>
+      </p:ext>
+    </p:extLst>
+  </p:cSld>
+  <p:clrMapOvr>
+    <a:masterClrMapping/>
+  </p:clrMapOvr>
+</p:notes>
+</file>
+
+<file path=ppt/notesSlides/notesSlide13.xml><?xml version="1.0" encoding="utf-8"?>
+<p:notes xmlns:a="http://schemas.openxmlformats.org/drawingml/2006/main" xmlns:r="http://schemas.openxmlformats.org/officeDocument/2006/relationships" xmlns:p="http://schemas.openxmlformats.org/presentationml/2006/main" showMasterSp="0" showMasterPhAnim="0">
+  <p:cSld>
+    <p:spTree>
+      <p:nvGrpSpPr>
         <p:cNvPr id="1" name="Shape 350"/>
         <p:cNvGrpSpPr/>
         <p:nvPr/>
@@ -1698,7 +2029,7 @@
 </p:notes>
 </file>
 
-<file path=ppt/notesSlides/notesSlide11.xml><?xml version="1.0" encoding="utf-8"?>
+<file path=ppt/notesSlides/notesSlide14.xml><?xml version="1.0" encoding="utf-8"?>
 <p:notes xmlns:a="http://schemas.openxmlformats.org/drawingml/2006/main" xmlns:r="http://schemas.openxmlformats.org/officeDocument/2006/relationships" xmlns:p="http://schemas.openxmlformats.org/presentationml/2006/main" showMasterSp="0" showMasterPhAnim="0">
   <p:cSld>
     <p:spTree>
@@ -1802,7 +2133,116 @@
 </p:notes>
 </file>
 
-<file path=ppt/notesSlides/notesSlide12.xml><?xml version="1.0" encoding="utf-8"?>
+<file path=ppt/notesSlides/notesSlide15.xml><?xml version="1.0" encoding="utf-8"?>
+<p:notes xmlns:a="http://schemas.openxmlformats.org/drawingml/2006/main" xmlns:r="http://schemas.openxmlformats.org/officeDocument/2006/relationships" xmlns:p="http://schemas.openxmlformats.org/presentationml/2006/main" showMasterSp="0" showMasterPhAnim="0">
+  <p:cSld>
+    <p:spTree>
+      <p:nvGrpSpPr>
+        <p:cNvPr id="1" name="Shape 344"/>
+        <p:cNvGrpSpPr/>
+        <p:nvPr/>
+      </p:nvGrpSpPr>
+      <p:grpSpPr>
+        <a:xfrm>
+          <a:off x="0" y="0"/>
+          <a:ext cx="0" cy="0"/>
+          <a:chOff x="0" y="0"/>
+          <a:chExt cx="0" cy="0"/>
+        </a:xfrm>
+      </p:grpSpPr>
+      <p:sp>
+        <p:nvSpPr>
+          <p:cNvPr id="345" name="Google Shape;345;p4:notes"/>
+          <p:cNvSpPr txBox="1">
+            <a:spLocks noGrp="1"/>
+          </p:cNvSpPr>
+          <p:nvPr>
+            <p:ph type="body" idx="1"/>
+          </p:nvPr>
+        </p:nvSpPr>
+        <p:spPr>
+          <a:xfrm>
+            <a:off x="685800" y="4400550"/>
+            <a:ext cx="5486400" cy="3600450"/>
+          </a:xfrm>
+          <a:prstGeom prst="rect">
+            <a:avLst/>
+          </a:prstGeom>
+        </p:spPr>
+        <p:txBody>
+          <a:bodyPr spcFirstLastPara="1" wrap="square" lIns="91425" tIns="45700" rIns="91425" bIns="45700" anchor="t" anchorCtr="0">
+            <a:noAutofit/>
+          </a:bodyPr>
+          <a:lstStyle/>
+          <a:p>
+            <a:pPr marL="0" lvl="0" indent="0" algn="l" rtl="0">
+              <a:spcBef>
+                <a:spcPts val="0"/>
+              </a:spcBef>
+              <a:spcAft>
+                <a:spcPts val="0"/>
+              </a:spcAft>
+              <a:buNone/>
+            </a:pPr>
+            <a:endParaRPr/>
+          </a:p>
+        </p:txBody>
+      </p:sp>
+      <p:sp>
+        <p:nvSpPr>
+          <p:cNvPr id="346" name="Google Shape;346;p4:notes"/>
+          <p:cNvSpPr>
+            <a:spLocks noGrp="1" noRot="1" noChangeAspect="1"/>
+          </p:cNvSpPr>
+          <p:nvPr>
+            <p:ph type="sldImg" idx="2"/>
+          </p:nvPr>
+        </p:nvSpPr>
+        <p:spPr>
+          <a:xfrm>
+            <a:off x="685800" y="1143000"/>
+            <a:ext cx="5486400" cy="3086100"/>
+          </a:xfrm>
+          <a:custGeom>
+            <a:avLst/>
+            <a:gdLst/>
+            <a:ahLst/>
+            <a:cxnLst/>
+            <a:rect l="l" t="t" r="r" b="b"/>
+            <a:pathLst>
+              <a:path w="120000" h="120000" extrusionOk="0">
+                <a:moveTo>
+                  <a:pt x="0" y="0"/>
+                </a:moveTo>
+                <a:lnTo>
+                  <a:pt x="120000" y="0"/>
+                </a:lnTo>
+                <a:lnTo>
+                  <a:pt x="120000" y="120000"/>
+                </a:lnTo>
+                <a:lnTo>
+                  <a:pt x="0" y="120000"/>
+                </a:lnTo>
+                <a:close/>
+              </a:path>
+            </a:pathLst>
+          </a:custGeom>
+        </p:spPr>
+      </p:sp>
+    </p:spTree>
+    <p:extLst>
+      <p:ext uri="{BB962C8B-B14F-4D97-AF65-F5344CB8AC3E}">
+        <p14:creationId xmlns:p14="http://schemas.microsoft.com/office/powerpoint/2010/main" val="1457969371"/>
+      </p:ext>
+    </p:extLst>
+  </p:cSld>
+  <p:clrMapOvr>
+    <a:masterClrMapping/>
+  </p:clrMapOvr>
+</p:notes>
+</file>
+
+<file path=ppt/notesSlides/notesSlide16.xml><?xml version="1.0" encoding="utf-8"?>
 <p:notes xmlns:a="http://schemas.openxmlformats.org/drawingml/2006/main" xmlns:r="http://schemas.openxmlformats.org/officeDocument/2006/relationships" xmlns:p="http://schemas.openxmlformats.org/presentationml/2006/main" showMasterSp="0" showMasterPhAnim="0">
   <p:cSld>
     <p:spTree>
@@ -2669,7 +3109,7 @@
   <p:cSld>
     <p:spTree>
       <p:nvGrpSpPr>
-        <p:cNvPr id="1" name="Shape 321"/>
+        <p:cNvPr id="1" name="Shape 344"/>
         <p:cNvGrpSpPr/>
         <p:nvPr/>
       </p:nvGrpSpPr>
@@ -2683,7 +3123,7 @@
       </p:grpSpPr>
       <p:sp>
         <p:nvSpPr>
-          <p:cNvPr id="322" name="Google Shape;322;p2:notes"/>
+          <p:cNvPr id="345" name="Google Shape;345;p4:notes"/>
           <p:cNvSpPr txBox="1">
             <a:spLocks noGrp="1"/>
           </p:cNvSpPr>
@@ -2721,7 +3161,7 @@
       </p:sp>
       <p:sp>
         <p:nvSpPr>
-          <p:cNvPr id="323" name="Google Shape;323;p2:notes"/>
+          <p:cNvPr id="346" name="Google Shape;346;p4:notes"/>
           <p:cNvSpPr>
             <a:spLocks noGrp="1" noRot="1" noChangeAspect="1"/>
           </p:cNvSpPr>
@@ -2763,7 +3203,7 @@
     </p:spTree>
     <p:extLst>
       <p:ext uri="{BB962C8B-B14F-4D97-AF65-F5344CB8AC3E}">
-        <p14:creationId xmlns:p14="http://schemas.microsoft.com/office/powerpoint/2010/main" val="1248237262"/>
+        <p14:creationId xmlns:p14="http://schemas.microsoft.com/office/powerpoint/2010/main" val="3124726378"/>
       </p:ext>
     </p:extLst>
   </p:cSld>
@@ -13334,6 +13774,709 @@
   <p:cSld>
     <p:spTree>
       <p:nvGrpSpPr>
+        <p:cNvPr id="1" name="Shape 347"/>
+        <p:cNvGrpSpPr/>
+        <p:nvPr/>
+      </p:nvGrpSpPr>
+      <p:grpSpPr>
+        <a:xfrm>
+          <a:off x="0" y="0"/>
+          <a:ext cx="0" cy="0"/>
+          <a:chOff x="0" y="0"/>
+          <a:chExt cx="0" cy="0"/>
+        </a:xfrm>
+      </p:grpSpPr>
+      <p:sp>
+        <p:nvSpPr>
+          <p:cNvPr id="7" name="Google Shape;325;p33">
+            <a:extLst>
+              <a:ext uri="{FF2B5EF4-FFF2-40B4-BE49-F238E27FC236}">
+                <a16:creationId xmlns:a16="http://schemas.microsoft.com/office/drawing/2014/main" id="{B8E8687A-CA58-417A-8418-DB13040BEBA1}"/>
+              </a:ext>
+            </a:extLst>
+          </p:cNvPr>
+          <p:cNvSpPr txBox="1">
+            <a:spLocks/>
+          </p:cNvSpPr>
+          <p:nvPr/>
+        </p:nvSpPr>
+        <p:spPr>
+          <a:xfrm>
+            <a:off x="919824" y="563526"/>
+            <a:ext cx="6634500" cy="677874"/>
+          </a:xfrm>
+          <a:prstGeom prst="rect">
+            <a:avLst/>
+          </a:prstGeom>
+          <a:noFill/>
+          <a:ln>
+            <a:noFill/>
+          </a:ln>
+        </p:spPr>
+        <p:txBody>
+          <a:bodyPr spcFirstLastPara="1" wrap="square" lIns="68575" tIns="34275" rIns="68575" bIns="34275" anchor="b" anchorCtr="0">
+            <a:noAutofit/>
+          </a:bodyPr>
+          <a:lstStyle>
+            <a:defPPr marR="0" lvl="0" algn="l" rtl="0">
+              <a:lnSpc>
+                <a:spcPct val="100000"/>
+              </a:lnSpc>
+              <a:spcBef>
+                <a:spcPts val="0"/>
+              </a:spcBef>
+              <a:spcAft>
+                <a:spcPts val="0"/>
+              </a:spcAft>
+            </a:defPPr>
+            <a:lvl1pPr marR="0" lvl="0" algn="l" rtl="0">
+              <a:lnSpc>
+                <a:spcPct val="100000"/>
+              </a:lnSpc>
+              <a:spcBef>
+                <a:spcPts val="0"/>
+              </a:spcBef>
+              <a:spcAft>
+                <a:spcPts val="0"/>
+              </a:spcAft>
+              <a:buClr>
+                <a:srgbClr val="000000"/>
+              </a:buClr>
+              <a:buFont typeface="Arial"/>
+              <a:defRPr sz="1400" b="0" i="0" u="none" strike="noStrike" cap="none">
+                <a:solidFill>
+                  <a:srgbClr val="000000"/>
+                </a:solidFill>
+                <a:latin typeface="Arial"/>
+                <a:ea typeface="Arial"/>
+                <a:cs typeface="Arial"/>
+                <a:sym typeface="Arial"/>
+              </a:defRPr>
+            </a:lvl1pPr>
+            <a:lvl2pPr marR="0" lvl="1" algn="l" rtl="0">
+              <a:lnSpc>
+                <a:spcPct val="100000"/>
+              </a:lnSpc>
+              <a:spcBef>
+                <a:spcPts val="0"/>
+              </a:spcBef>
+              <a:spcAft>
+                <a:spcPts val="0"/>
+              </a:spcAft>
+              <a:buClr>
+                <a:srgbClr val="000000"/>
+              </a:buClr>
+              <a:buFont typeface="Arial"/>
+              <a:defRPr sz="1400" b="0" i="0" u="none" strike="noStrike" cap="none">
+                <a:solidFill>
+                  <a:srgbClr val="000000"/>
+                </a:solidFill>
+                <a:latin typeface="Arial"/>
+                <a:ea typeface="Arial"/>
+                <a:cs typeface="Arial"/>
+                <a:sym typeface="Arial"/>
+              </a:defRPr>
+            </a:lvl2pPr>
+            <a:lvl3pPr marR="0" lvl="2" algn="l" rtl="0">
+              <a:lnSpc>
+                <a:spcPct val="100000"/>
+              </a:lnSpc>
+              <a:spcBef>
+                <a:spcPts val="0"/>
+              </a:spcBef>
+              <a:spcAft>
+                <a:spcPts val="0"/>
+              </a:spcAft>
+              <a:buClr>
+                <a:srgbClr val="000000"/>
+              </a:buClr>
+              <a:buFont typeface="Arial"/>
+              <a:defRPr sz="1400" b="0" i="0" u="none" strike="noStrike" cap="none">
+                <a:solidFill>
+                  <a:srgbClr val="000000"/>
+                </a:solidFill>
+                <a:latin typeface="Arial"/>
+                <a:ea typeface="Arial"/>
+                <a:cs typeface="Arial"/>
+                <a:sym typeface="Arial"/>
+              </a:defRPr>
+            </a:lvl3pPr>
+            <a:lvl4pPr marR="0" lvl="3" algn="l" rtl="0">
+              <a:lnSpc>
+                <a:spcPct val="100000"/>
+              </a:lnSpc>
+              <a:spcBef>
+                <a:spcPts val="0"/>
+              </a:spcBef>
+              <a:spcAft>
+                <a:spcPts val="0"/>
+              </a:spcAft>
+              <a:buClr>
+                <a:srgbClr val="000000"/>
+              </a:buClr>
+              <a:buFont typeface="Arial"/>
+              <a:defRPr sz="1400" b="0" i="0" u="none" strike="noStrike" cap="none">
+                <a:solidFill>
+                  <a:srgbClr val="000000"/>
+                </a:solidFill>
+                <a:latin typeface="Arial"/>
+                <a:ea typeface="Arial"/>
+                <a:cs typeface="Arial"/>
+                <a:sym typeface="Arial"/>
+              </a:defRPr>
+            </a:lvl4pPr>
+            <a:lvl5pPr marR="0" lvl="4" algn="l" rtl="0">
+              <a:lnSpc>
+                <a:spcPct val="100000"/>
+              </a:lnSpc>
+              <a:spcBef>
+                <a:spcPts val="0"/>
+              </a:spcBef>
+              <a:spcAft>
+                <a:spcPts val="0"/>
+              </a:spcAft>
+              <a:buClr>
+                <a:srgbClr val="000000"/>
+              </a:buClr>
+              <a:buFont typeface="Arial"/>
+              <a:defRPr sz="1400" b="0" i="0" u="none" strike="noStrike" cap="none">
+                <a:solidFill>
+                  <a:srgbClr val="000000"/>
+                </a:solidFill>
+                <a:latin typeface="Arial"/>
+                <a:ea typeface="Arial"/>
+                <a:cs typeface="Arial"/>
+                <a:sym typeface="Arial"/>
+              </a:defRPr>
+            </a:lvl5pPr>
+            <a:lvl6pPr marR="0" lvl="5" algn="l" rtl="0">
+              <a:lnSpc>
+                <a:spcPct val="100000"/>
+              </a:lnSpc>
+              <a:spcBef>
+                <a:spcPts val="0"/>
+              </a:spcBef>
+              <a:spcAft>
+                <a:spcPts val="0"/>
+              </a:spcAft>
+              <a:buClr>
+                <a:srgbClr val="000000"/>
+              </a:buClr>
+              <a:buFont typeface="Arial"/>
+              <a:defRPr sz="1400" b="0" i="0" u="none" strike="noStrike" cap="none">
+                <a:solidFill>
+                  <a:srgbClr val="000000"/>
+                </a:solidFill>
+                <a:latin typeface="Arial"/>
+                <a:ea typeface="Arial"/>
+                <a:cs typeface="Arial"/>
+                <a:sym typeface="Arial"/>
+              </a:defRPr>
+            </a:lvl6pPr>
+            <a:lvl7pPr marR="0" lvl="6" algn="l" rtl="0">
+              <a:lnSpc>
+                <a:spcPct val="100000"/>
+              </a:lnSpc>
+              <a:spcBef>
+                <a:spcPts val="0"/>
+              </a:spcBef>
+              <a:spcAft>
+                <a:spcPts val="0"/>
+              </a:spcAft>
+              <a:buClr>
+                <a:srgbClr val="000000"/>
+              </a:buClr>
+              <a:buFont typeface="Arial"/>
+              <a:defRPr sz="1400" b="0" i="0" u="none" strike="noStrike" cap="none">
+                <a:solidFill>
+                  <a:srgbClr val="000000"/>
+                </a:solidFill>
+                <a:latin typeface="Arial"/>
+                <a:ea typeface="Arial"/>
+                <a:cs typeface="Arial"/>
+                <a:sym typeface="Arial"/>
+              </a:defRPr>
+            </a:lvl7pPr>
+            <a:lvl8pPr marR="0" lvl="7" algn="l" rtl="0">
+              <a:lnSpc>
+                <a:spcPct val="100000"/>
+              </a:lnSpc>
+              <a:spcBef>
+                <a:spcPts val="0"/>
+              </a:spcBef>
+              <a:spcAft>
+                <a:spcPts val="0"/>
+              </a:spcAft>
+              <a:buClr>
+                <a:srgbClr val="000000"/>
+              </a:buClr>
+              <a:buFont typeface="Arial"/>
+              <a:defRPr sz="1400" b="0" i="0" u="none" strike="noStrike" cap="none">
+                <a:solidFill>
+                  <a:srgbClr val="000000"/>
+                </a:solidFill>
+                <a:latin typeface="Arial"/>
+                <a:ea typeface="Arial"/>
+                <a:cs typeface="Arial"/>
+                <a:sym typeface="Arial"/>
+              </a:defRPr>
+            </a:lvl8pPr>
+            <a:lvl9pPr marR="0" lvl="8" algn="l" rtl="0">
+              <a:lnSpc>
+                <a:spcPct val="100000"/>
+              </a:lnSpc>
+              <a:spcBef>
+                <a:spcPts val="0"/>
+              </a:spcBef>
+              <a:spcAft>
+                <a:spcPts val="0"/>
+              </a:spcAft>
+              <a:buClr>
+                <a:srgbClr val="000000"/>
+              </a:buClr>
+              <a:buFont typeface="Arial"/>
+              <a:defRPr sz="1400" b="0" i="0" u="none" strike="noStrike" cap="none">
+                <a:solidFill>
+                  <a:srgbClr val="000000"/>
+                </a:solidFill>
+                <a:latin typeface="Arial"/>
+                <a:ea typeface="Arial"/>
+                <a:cs typeface="Arial"/>
+                <a:sym typeface="Arial"/>
+              </a:defRPr>
+            </a:lvl9pPr>
+          </a:lstStyle>
+          <a:p>
+            <a:pPr algn="ctr">
+              <a:lnSpc>
+                <a:spcPct val="90000"/>
+              </a:lnSpc>
+              <a:buClr>
+                <a:schemeClr val="dk1"/>
+              </a:buClr>
+              <a:buSzPts val="4500"/>
+              <a:buFont typeface="Nunito Sans Black"/>
+              <a:buNone/>
+            </a:pPr>
+            <a:r>
+              <a:rPr lang="es-ES" sz="5400" dirty="0">
+                <a:solidFill>
+                  <a:schemeClr val="bg2"/>
+                </a:solidFill>
+                <a:latin typeface="Squada One" panose="020B0604020202020204" charset="0"/>
+              </a:rPr>
+              <a:t>Script</a:t>
+            </a:r>
+          </a:p>
+        </p:txBody>
+      </p:sp>
+      <p:pic>
+        <p:nvPicPr>
+          <p:cNvPr id="9" name="Imagem 8">
+            <a:extLst>
+              <a:ext uri="{FF2B5EF4-FFF2-40B4-BE49-F238E27FC236}">
+                <a16:creationId xmlns:a16="http://schemas.microsoft.com/office/drawing/2014/main" id="{C59318DA-2044-4389-969D-8D89C9E838EE}"/>
+              </a:ext>
+            </a:extLst>
+          </p:cNvPr>
+          <p:cNvPicPr>
+            <a:picLocks noChangeAspect="1"/>
+          </p:cNvPicPr>
+          <p:nvPr/>
+        </p:nvPicPr>
+        <p:blipFill>
+          <a:blip r:embed="rId3"/>
+          <a:stretch>
+            <a:fillRect/>
+          </a:stretch>
+        </p:blipFill>
+        <p:spPr>
+          <a:xfrm>
+            <a:off x="2054410" y="1562987"/>
+            <a:ext cx="5035180" cy="3016987"/>
+          </a:xfrm>
+          <a:prstGeom prst="rect">
+            <a:avLst/>
+          </a:prstGeom>
+        </p:spPr>
+      </p:pic>
+    </p:spTree>
+    <p:extLst>
+      <p:ext uri="{BB962C8B-B14F-4D97-AF65-F5344CB8AC3E}">
+        <p14:creationId xmlns:p14="http://schemas.microsoft.com/office/powerpoint/2010/main" val="853263048"/>
+      </p:ext>
+    </p:extLst>
+  </p:cSld>
+  <p:clrMapOvr>
+    <a:masterClrMapping/>
+  </p:clrMapOvr>
+</p:sld>
+</file>
+
+<file path=ppt/slides/slide11.xml><?xml version="1.0" encoding="utf-8"?>
+<p:sld xmlns:a="http://schemas.openxmlformats.org/drawingml/2006/main" xmlns:r="http://schemas.openxmlformats.org/officeDocument/2006/relationships" xmlns:p="http://schemas.openxmlformats.org/presentationml/2006/main">
+  <p:cSld>
+    <p:spTree>
+      <p:nvGrpSpPr>
+        <p:cNvPr id="1" name="Shape 324"/>
+        <p:cNvGrpSpPr/>
+        <p:nvPr/>
+      </p:nvGrpSpPr>
+      <p:grpSpPr>
+        <a:xfrm>
+          <a:off x="0" y="0"/>
+          <a:ext cx="0" cy="0"/>
+          <a:chOff x="0" y="0"/>
+          <a:chExt cx="0" cy="0"/>
+        </a:xfrm>
+      </p:grpSpPr>
+      <p:sp>
+        <p:nvSpPr>
+          <p:cNvPr id="325" name="Google Shape;325;p33"/>
+          <p:cNvSpPr txBox="1">
+            <a:spLocks noGrp="1"/>
+          </p:cNvSpPr>
+          <p:nvPr>
+            <p:ph type="ctrTitle"/>
+          </p:nvPr>
+        </p:nvSpPr>
+        <p:spPr>
+          <a:xfrm>
+            <a:off x="919824" y="563526"/>
+            <a:ext cx="6634500" cy="677874"/>
+          </a:xfrm>
+          <a:prstGeom prst="rect">
+            <a:avLst/>
+          </a:prstGeom>
+          <a:noFill/>
+          <a:ln>
+            <a:noFill/>
+          </a:ln>
+        </p:spPr>
+        <p:txBody>
+          <a:bodyPr spcFirstLastPara="1" wrap="square" lIns="68575" tIns="34275" rIns="68575" bIns="34275" anchor="b" anchorCtr="0">
+            <a:noAutofit/>
+          </a:bodyPr>
+          <a:lstStyle/>
+          <a:p>
+            <a:pPr marL="0" lvl="0" indent="0" algn="ctr" rtl="0">
+              <a:lnSpc>
+                <a:spcPct val="90000"/>
+              </a:lnSpc>
+              <a:spcBef>
+                <a:spcPts val="0"/>
+              </a:spcBef>
+              <a:spcAft>
+                <a:spcPts val="0"/>
+              </a:spcAft>
+              <a:buClr>
+                <a:schemeClr val="dk1"/>
+              </a:buClr>
+              <a:buSzPts val="4500"/>
+              <a:buFont typeface="Nunito Sans Black"/>
+              <a:buNone/>
+            </a:pPr>
+            <a:r>
+              <a:rPr lang="es-ES" sz="4400" dirty="0"/>
+              <a:t>Git Hub</a:t>
+            </a:r>
+            <a:endParaRPr sz="4400" b="0" dirty="0"/>
+          </a:p>
+        </p:txBody>
+      </p:sp>
+      <p:sp>
+        <p:nvSpPr>
+          <p:cNvPr id="3" name="Elipse 2">
+            <a:extLst>
+              <a:ext uri="{FF2B5EF4-FFF2-40B4-BE49-F238E27FC236}">
+                <a16:creationId xmlns:a16="http://schemas.microsoft.com/office/drawing/2014/main" id="{1D724B25-7A5F-4354-BC41-A08CB4054025}"/>
+              </a:ext>
+            </a:extLst>
+          </p:cNvPr>
+          <p:cNvSpPr/>
+          <p:nvPr/>
+        </p:nvSpPr>
+        <p:spPr>
+          <a:xfrm>
+            <a:off x="3417039" y="1752046"/>
+            <a:ext cx="1654692" cy="1673298"/>
+          </a:xfrm>
+          <a:prstGeom prst="ellipse">
+            <a:avLst/>
+          </a:prstGeom>
+          <a:solidFill>
+            <a:schemeClr val="bg2"/>
+          </a:solidFill>
+          <a:ln>
+            <a:solidFill>
+              <a:schemeClr val="bg1"/>
+            </a:solidFill>
+          </a:ln>
+        </p:spPr>
+        <p:style>
+          <a:lnRef idx="2">
+            <a:schemeClr val="accent1">
+              <a:shade val="50000"/>
+            </a:schemeClr>
+          </a:lnRef>
+          <a:fillRef idx="1">
+            <a:schemeClr val="accent1"/>
+          </a:fillRef>
+          <a:effectRef idx="0">
+            <a:schemeClr val="accent1"/>
+          </a:effectRef>
+          <a:fontRef idx="minor">
+            <a:schemeClr val="lt1"/>
+          </a:fontRef>
+        </p:style>
+        <p:txBody>
+          <a:bodyPr rtlCol="0" anchor="ctr"/>
+          <a:lstStyle/>
+          <a:p>
+            <a:pPr algn="ctr"/>
+            <a:endParaRPr lang="pt-BR"/>
+          </a:p>
+        </p:txBody>
+      </p:sp>
+      <p:pic>
+        <p:nvPicPr>
+          <p:cNvPr id="1026" name="Picture 2" descr="github grátis ícone">
+            <a:extLst>
+              <a:ext uri="{FF2B5EF4-FFF2-40B4-BE49-F238E27FC236}">
+                <a16:creationId xmlns:a16="http://schemas.microsoft.com/office/drawing/2014/main" id="{4D97FEFC-032C-4AF3-A44F-8E8897FBE273}"/>
+              </a:ext>
+            </a:extLst>
+          </p:cNvPr>
+          <p:cNvPicPr>
+            <a:picLocks noChangeAspect="1" noChangeArrowheads="1"/>
+          </p:cNvPicPr>
+          <p:nvPr/>
+        </p:nvPicPr>
+        <p:blipFill>
+          <a:blip r:embed="rId3">
+            <a:extLst>
+              <a:ext uri="{28A0092B-C50C-407E-A947-70E740481C1C}">
+                <a14:useLocalDpi xmlns:a14="http://schemas.microsoft.com/office/drawing/2010/main" val="0"/>
+              </a:ext>
+            </a:extLst>
+          </a:blip>
+          <a:srcRect/>
+          <a:stretch>
+            <a:fillRect/>
+          </a:stretch>
+        </p:blipFill>
+        <p:spPr bwMode="auto">
+          <a:xfrm>
+            <a:off x="3191373" y="1594551"/>
+            <a:ext cx="2048871" cy="1954397"/>
+          </a:xfrm>
+          <a:prstGeom prst="rect">
+            <a:avLst/>
+          </a:prstGeom>
+          <a:noFill/>
+          <a:extLst>
+            <a:ext uri="{909E8E84-426E-40DD-AFC4-6F175D3DCCD1}">
+              <a14:hiddenFill xmlns:a14="http://schemas.microsoft.com/office/drawing/2010/main">
+                <a:solidFill>
+                  <a:srgbClr val="FFFFFF"/>
+                </a:solidFill>
+              </a14:hiddenFill>
+            </a:ext>
+          </a:extLst>
+        </p:spPr>
+      </p:pic>
+    </p:spTree>
+    <p:extLst>
+      <p:ext uri="{BB962C8B-B14F-4D97-AF65-F5344CB8AC3E}">
+        <p14:creationId xmlns:p14="http://schemas.microsoft.com/office/powerpoint/2010/main" val="1746633968"/>
+      </p:ext>
+    </p:extLst>
+  </p:cSld>
+  <p:clrMapOvr>
+    <a:masterClrMapping/>
+  </p:clrMapOvr>
+</p:sld>
+</file>
+
+<file path=ppt/slides/slide12.xml><?xml version="1.0" encoding="utf-8"?>
+<p:sld xmlns:a="http://schemas.openxmlformats.org/drawingml/2006/main" xmlns:r="http://schemas.openxmlformats.org/officeDocument/2006/relationships" xmlns:p="http://schemas.openxmlformats.org/presentationml/2006/main">
+  <p:cSld>
+    <p:spTree>
+      <p:nvGrpSpPr>
+        <p:cNvPr id="1" name="Shape 324"/>
+        <p:cNvGrpSpPr/>
+        <p:nvPr/>
+      </p:nvGrpSpPr>
+      <p:grpSpPr>
+        <a:xfrm>
+          <a:off x="0" y="0"/>
+          <a:ext cx="0" cy="0"/>
+          <a:chOff x="0" y="0"/>
+          <a:chExt cx="0" cy="0"/>
+        </a:xfrm>
+      </p:grpSpPr>
+      <p:sp>
+        <p:nvSpPr>
+          <p:cNvPr id="325" name="Google Shape;325;p33"/>
+          <p:cNvSpPr txBox="1">
+            <a:spLocks noGrp="1"/>
+          </p:cNvSpPr>
+          <p:nvPr>
+            <p:ph type="ctrTitle"/>
+          </p:nvPr>
+        </p:nvSpPr>
+        <p:spPr>
+          <a:xfrm>
+            <a:off x="919824" y="563526"/>
+            <a:ext cx="6634500" cy="677874"/>
+          </a:xfrm>
+          <a:prstGeom prst="rect">
+            <a:avLst/>
+          </a:prstGeom>
+          <a:noFill/>
+          <a:ln>
+            <a:noFill/>
+          </a:ln>
+        </p:spPr>
+        <p:txBody>
+          <a:bodyPr spcFirstLastPara="1" wrap="square" lIns="68575" tIns="34275" rIns="68575" bIns="34275" anchor="b" anchorCtr="0">
+            <a:noAutofit/>
+          </a:bodyPr>
+          <a:lstStyle/>
+          <a:p>
+            <a:pPr marL="0" lvl="0" indent="0" algn="ctr" rtl="0">
+              <a:lnSpc>
+                <a:spcPct val="90000"/>
+              </a:lnSpc>
+              <a:spcBef>
+                <a:spcPts val="0"/>
+              </a:spcBef>
+              <a:spcAft>
+                <a:spcPts val="0"/>
+              </a:spcAft>
+              <a:buClr>
+                <a:schemeClr val="dk1"/>
+              </a:buClr>
+              <a:buSzPts val="4500"/>
+              <a:buFont typeface="Nunito Sans Black"/>
+              <a:buNone/>
+            </a:pPr>
+            <a:r>
+              <a:rPr lang="es-ES" sz="4400" b="0" dirty="0"/>
+              <a:t>Site</a:t>
+            </a:r>
+            <a:endParaRPr sz="4400" b="0" dirty="0"/>
+          </a:p>
+        </p:txBody>
+      </p:sp>
+      <p:pic>
+        <p:nvPicPr>
+          <p:cNvPr id="5" name="Imagem 4">
+            <a:extLst>
+              <a:ext uri="{FF2B5EF4-FFF2-40B4-BE49-F238E27FC236}">
+                <a16:creationId xmlns:a16="http://schemas.microsoft.com/office/drawing/2014/main" id="{56B93501-03BF-42FD-9E45-B7A6E584A7EF}"/>
+              </a:ext>
+            </a:extLst>
+          </p:cNvPr>
+          <p:cNvPicPr>
+            <a:picLocks noChangeAspect="1"/>
+          </p:cNvPicPr>
+          <p:nvPr/>
+        </p:nvPicPr>
+        <p:blipFill>
+          <a:blip r:embed="rId3"/>
+          <a:stretch>
+            <a:fillRect/>
+          </a:stretch>
+        </p:blipFill>
+        <p:spPr>
+          <a:xfrm>
+            <a:off x="919824" y="2014649"/>
+            <a:ext cx="1567195" cy="1567195"/>
+          </a:xfrm>
+          <a:prstGeom prst="rect">
+            <a:avLst/>
+          </a:prstGeom>
+        </p:spPr>
+      </p:pic>
+      <p:pic>
+        <p:nvPicPr>
+          <p:cNvPr id="7" name="Imagem 6">
+            <a:extLst>
+              <a:ext uri="{FF2B5EF4-FFF2-40B4-BE49-F238E27FC236}">
+                <a16:creationId xmlns:a16="http://schemas.microsoft.com/office/drawing/2014/main" id="{D5111524-542B-4576-988B-95DB4CC25EC6}"/>
+              </a:ext>
+            </a:extLst>
+          </p:cNvPr>
+          <p:cNvPicPr>
+            <a:picLocks noChangeAspect="1"/>
+          </p:cNvPicPr>
+          <p:nvPr/>
+        </p:nvPicPr>
+        <p:blipFill>
+          <a:blip r:embed="rId4"/>
+          <a:stretch>
+            <a:fillRect/>
+          </a:stretch>
+        </p:blipFill>
+        <p:spPr>
+          <a:xfrm>
+            <a:off x="3648075" y="1504286"/>
+            <a:ext cx="1567195" cy="1567195"/>
+          </a:xfrm>
+          <a:prstGeom prst="rect">
+            <a:avLst/>
+          </a:prstGeom>
+        </p:spPr>
+      </p:pic>
+      <p:pic>
+        <p:nvPicPr>
+          <p:cNvPr id="11" name="Imagem 10">
+            <a:extLst>
+              <a:ext uri="{FF2B5EF4-FFF2-40B4-BE49-F238E27FC236}">
+                <a16:creationId xmlns:a16="http://schemas.microsoft.com/office/drawing/2014/main" id="{9EE8156E-9575-4210-9A46-093BABC84DE8}"/>
+              </a:ext>
+            </a:extLst>
+          </p:cNvPr>
+          <p:cNvPicPr>
+            <a:picLocks noChangeAspect="1"/>
+          </p:cNvPicPr>
+          <p:nvPr/>
+        </p:nvPicPr>
+        <p:blipFill>
+          <a:blip r:embed="rId5"/>
+          <a:stretch>
+            <a:fillRect/>
+          </a:stretch>
+        </p:blipFill>
+        <p:spPr>
+          <a:xfrm>
+            <a:off x="6376327" y="1929349"/>
+            <a:ext cx="1737794" cy="1737794"/>
+          </a:xfrm>
+          <a:prstGeom prst="rect">
+            <a:avLst/>
+          </a:prstGeom>
+        </p:spPr>
+      </p:pic>
+    </p:spTree>
+    <p:extLst>
+      <p:ext uri="{BB962C8B-B14F-4D97-AF65-F5344CB8AC3E}">
+        <p14:creationId xmlns:p14="http://schemas.microsoft.com/office/powerpoint/2010/main" val="1892733896"/>
+      </p:ext>
+    </p:extLst>
+  </p:cSld>
+  <p:clrMapOvr>
+    <a:masterClrMapping/>
+  </p:clrMapOvr>
+</p:sld>
+</file>
+
+<file path=ppt/slides/slide13.xml><?xml version="1.0" encoding="utf-8"?>
+<p:sld xmlns:a="http://schemas.openxmlformats.org/drawingml/2006/main" xmlns:r="http://schemas.openxmlformats.org/officeDocument/2006/relationships" xmlns:p="http://schemas.openxmlformats.org/presentationml/2006/main">
+  <p:cSld>
+    <p:spTree>
+      <p:nvGrpSpPr>
         <p:cNvPr id="1" name="Shape 353"/>
         <p:cNvGrpSpPr/>
         <p:nvPr/>
@@ -13401,7 +14544,7 @@
 </p:sld>
 </file>
 
-<file path=ppt/slides/slide11.xml><?xml version="1.0" encoding="utf-8"?>
+<file path=ppt/slides/slide14.xml><?xml version="1.0" encoding="utf-8"?>
 <p:sld xmlns:a="http://schemas.openxmlformats.org/drawingml/2006/main" xmlns:r="http://schemas.openxmlformats.org/officeDocument/2006/relationships" xmlns:p="http://schemas.openxmlformats.org/presentationml/2006/main">
   <p:cSld>
     <p:spTree>
@@ -13864,7 +15007,487 @@
 </p:sld>
 </file>
 
-<file path=ppt/slides/slide12.xml><?xml version="1.0" encoding="utf-8"?>
+<file path=ppt/slides/slide15.xml><?xml version="1.0" encoding="utf-8"?>
+<p:sld xmlns:a="http://schemas.openxmlformats.org/drawingml/2006/main" xmlns:r="http://schemas.openxmlformats.org/officeDocument/2006/relationships" xmlns:p="http://schemas.openxmlformats.org/presentationml/2006/main">
+  <p:cSld>
+    <p:spTree>
+      <p:nvGrpSpPr>
+        <p:cNvPr id="1" name="Shape 347"/>
+        <p:cNvGrpSpPr/>
+        <p:nvPr/>
+      </p:nvGrpSpPr>
+      <p:grpSpPr>
+        <a:xfrm>
+          <a:off x="0" y="0"/>
+          <a:ext cx="0" cy="0"/>
+          <a:chOff x="0" y="0"/>
+          <a:chExt cx="0" cy="0"/>
+        </a:xfrm>
+      </p:grpSpPr>
+      <p:sp>
+        <p:nvSpPr>
+          <p:cNvPr id="2" name="AutoShape 2">
+            <a:extLst>
+              <a:ext uri="{FF2B5EF4-FFF2-40B4-BE49-F238E27FC236}">
+                <a16:creationId xmlns:a16="http://schemas.microsoft.com/office/drawing/2014/main" id="{A71425A2-D64F-4C22-B2B1-804449146353}"/>
+              </a:ext>
+            </a:extLst>
+          </p:cNvPr>
+          <p:cNvSpPr>
+            <a:spLocks noChangeAspect="1" noChangeArrowheads="1"/>
+          </p:cNvSpPr>
+          <p:nvPr/>
+        </p:nvSpPr>
+        <p:spPr bwMode="auto">
+          <a:xfrm>
+            <a:off x="4419600" y="2419350"/>
+            <a:ext cx="304800" cy="304800"/>
+          </a:xfrm>
+          <a:prstGeom prst="rect">
+            <a:avLst/>
+          </a:prstGeom>
+          <a:noFill/>
+          <a:extLst>
+            <a:ext uri="{909E8E84-426E-40DD-AFC4-6F175D3DCCD1}">
+              <a14:hiddenFill xmlns:a14="http://schemas.microsoft.com/office/drawing/2010/main">
+                <a:solidFill>
+                  <a:srgbClr val="FFFFFF"/>
+                </a:solidFill>
+              </a14:hiddenFill>
+            </a:ext>
+          </a:extLst>
+        </p:spPr>
+        <p:txBody>
+          <a:bodyPr vert="horz" wrap="square" lIns="91440" tIns="45720" rIns="91440" bIns="45720" numCol="1" anchor="t" anchorCtr="0" compatLnSpc="1">
+            <a:prstTxWarp prst="textNoShape">
+              <a:avLst/>
+            </a:prstTxWarp>
+          </a:bodyPr>
+          <a:lstStyle/>
+          <a:p>
+            <a:endParaRPr lang="pt-BR"/>
+          </a:p>
+        </p:txBody>
+      </p:sp>
+      <p:sp>
+        <p:nvSpPr>
+          <p:cNvPr id="5" name="AutoShape 6">
+            <a:extLst>
+              <a:ext uri="{FF2B5EF4-FFF2-40B4-BE49-F238E27FC236}">
+                <a16:creationId xmlns:a16="http://schemas.microsoft.com/office/drawing/2014/main" id="{7E5EE193-AC14-4858-B644-54E159B01362}"/>
+              </a:ext>
+            </a:extLst>
+          </p:cNvPr>
+          <p:cNvSpPr>
+            <a:spLocks noChangeAspect="1" noChangeArrowheads="1"/>
+          </p:cNvSpPr>
+          <p:nvPr/>
+        </p:nvSpPr>
+        <p:spPr bwMode="auto">
+          <a:xfrm>
+            <a:off x="4572000" y="2571750"/>
+            <a:ext cx="2793880" cy="2793880"/>
+          </a:xfrm>
+          <a:prstGeom prst="rect">
+            <a:avLst/>
+          </a:prstGeom>
+          <a:noFill/>
+          <a:extLst>
+            <a:ext uri="{909E8E84-426E-40DD-AFC4-6F175D3DCCD1}">
+              <a14:hiddenFill xmlns:a14="http://schemas.microsoft.com/office/drawing/2010/main">
+                <a:solidFill>
+                  <a:srgbClr val="FFFFFF"/>
+                </a:solidFill>
+              </a14:hiddenFill>
+            </a:ext>
+          </a:extLst>
+        </p:spPr>
+        <p:txBody>
+          <a:bodyPr vert="horz" wrap="square" lIns="91440" tIns="45720" rIns="91440" bIns="45720" numCol="1" anchor="t" anchorCtr="0" compatLnSpc="1">
+            <a:prstTxWarp prst="textNoShape">
+              <a:avLst/>
+            </a:prstTxWarp>
+          </a:bodyPr>
+          <a:lstStyle/>
+          <a:p>
+            <a:endParaRPr lang="pt-BR"/>
+          </a:p>
+        </p:txBody>
+      </p:sp>
+      <p:pic>
+        <p:nvPicPr>
+          <p:cNvPr id="9" name="Imagem 8">
+            <a:extLst>
+              <a:ext uri="{FF2B5EF4-FFF2-40B4-BE49-F238E27FC236}">
+                <a16:creationId xmlns:a16="http://schemas.microsoft.com/office/drawing/2014/main" id="{131CE8C2-1A6F-427B-AD59-F60747E44B6F}"/>
+              </a:ext>
+            </a:extLst>
+          </p:cNvPr>
+          <p:cNvPicPr>
+            <a:picLocks noChangeAspect="1"/>
+          </p:cNvPicPr>
+          <p:nvPr/>
+        </p:nvPicPr>
+        <p:blipFill rotWithShape="1">
+          <a:blip r:embed="rId3"/>
+          <a:srcRect t="11468" b="12528"/>
+          <a:stretch/>
+        </p:blipFill>
+        <p:spPr>
+          <a:xfrm>
+            <a:off x="1335576" y="1177752"/>
+            <a:ext cx="2624309" cy="2902688"/>
+          </a:xfrm>
+          <a:prstGeom prst="rect">
+            <a:avLst/>
+          </a:prstGeom>
+          <a:ln>
+            <a:noFill/>
+          </a:ln>
+          <a:effectLst>
+            <a:softEdge rad="112500"/>
+          </a:effectLst>
+        </p:spPr>
+      </p:pic>
+      <p:pic>
+        <p:nvPicPr>
+          <p:cNvPr id="11" name="Imagem 10">
+            <a:extLst>
+              <a:ext uri="{FF2B5EF4-FFF2-40B4-BE49-F238E27FC236}">
+                <a16:creationId xmlns:a16="http://schemas.microsoft.com/office/drawing/2014/main" id="{08831E7B-AEAB-41A4-85D5-D68B817A1DD5}"/>
+              </a:ext>
+            </a:extLst>
+          </p:cNvPr>
+          <p:cNvPicPr>
+            <a:picLocks noChangeAspect="1"/>
+          </p:cNvPicPr>
+          <p:nvPr/>
+        </p:nvPicPr>
+        <p:blipFill rotWithShape="1">
+          <a:blip r:embed="rId4"/>
+          <a:srcRect l="15259" t="5708" b="30766"/>
+          <a:stretch/>
+        </p:blipFill>
+        <p:spPr>
+          <a:xfrm>
+            <a:off x="5184115" y="1161360"/>
+            <a:ext cx="2334165" cy="2820779"/>
+          </a:xfrm>
+          <a:prstGeom prst="rect">
+            <a:avLst/>
+          </a:prstGeom>
+          <a:ln>
+            <a:noFill/>
+          </a:ln>
+          <a:effectLst>
+            <a:softEdge rad="112500"/>
+          </a:effectLst>
+        </p:spPr>
+      </p:pic>
+      <p:sp>
+        <p:nvSpPr>
+          <p:cNvPr id="12" name="Google Shape;325;p33">
+            <a:extLst>
+              <a:ext uri="{FF2B5EF4-FFF2-40B4-BE49-F238E27FC236}">
+                <a16:creationId xmlns:a16="http://schemas.microsoft.com/office/drawing/2014/main" id="{F72F8AE9-019C-4ABC-ACBA-3BBC19683822}"/>
+              </a:ext>
+            </a:extLst>
+          </p:cNvPr>
+          <p:cNvSpPr txBox="1">
+            <a:spLocks/>
+          </p:cNvSpPr>
+          <p:nvPr/>
+        </p:nvSpPr>
+        <p:spPr>
+          <a:xfrm>
+            <a:off x="1102350" y="220626"/>
+            <a:ext cx="6634500" cy="677874"/>
+          </a:xfrm>
+          <a:prstGeom prst="rect">
+            <a:avLst/>
+          </a:prstGeom>
+          <a:noFill/>
+          <a:ln>
+            <a:noFill/>
+          </a:ln>
+        </p:spPr>
+        <p:txBody>
+          <a:bodyPr spcFirstLastPara="1" wrap="square" lIns="68575" tIns="34275" rIns="68575" bIns="34275" anchor="b" anchorCtr="0">
+            <a:noAutofit/>
+          </a:bodyPr>
+          <a:lstStyle>
+            <a:defPPr marR="0" lvl="0" algn="l" rtl="0">
+              <a:lnSpc>
+                <a:spcPct val="100000"/>
+              </a:lnSpc>
+              <a:spcBef>
+                <a:spcPts val="0"/>
+              </a:spcBef>
+              <a:spcAft>
+                <a:spcPts val="0"/>
+              </a:spcAft>
+            </a:defPPr>
+            <a:lvl1pPr marR="0" lvl="0" algn="l" rtl="0">
+              <a:lnSpc>
+                <a:spcPct val="100000"/>
+              </a:lnSpc>
+              <a:spcBef>
+                <a:spcPts val="0"/>
+              </a:spcBef>
+              <a:spcAft>
+                <a:spcPts val="0"/>
+              </a:spcAft>
+              <a:buClr>
+                <a:srgbClr val="000000"/>
+              </a:buClr>
+              <a:buFont typeface="Arial"/>
+              <a:defRPr sz="1400" b="0" i="0" u="none" strike="noStrike" cap="none">
+                <a:solidFill>
+                  <a:srgbClr val="000000"/>
+                </a:solidFill>
+                <a:latin typeface="Arial"/>
+                <a:ea typeface="Arial"/>
+                <a:cs typeface="Arial"/>
+                <a:sym typeface="Arial"/>
+              </a:defRPr>
+            </a:lvl1pPr>
+            <a:lvl2pPr marR="0" lvl="1" algn="l" rtl="0">
+              <a:lnSpc>
+                <a:spcPct val="100000"/>
+              </a:lnSpc>
+              <a:spcBef>
+                <a:spcPts val="0"/>
+              </a:spcBef>
+              <a:spcAft>
+                <a:spcPts val="0"/>
+              </a:spcAft>
+              <a:buClr>
+                <a:srgbClr val="000000"/>
+              </a:buClr>
+              <a:buFont typeface="Arial"/>
+              <a:defRPr sz="1400" b="0" i="0" u="none" strike="noStrike" cap="none">
+                <a:solidFill>
+                  <a:srgbClr val="000000"/>
+                </a:solidFill>
+                <a:latin typeface="Arial"/>
+                <a:ea typeface="Arial"/>
+                <a:cs typeface="Arial"/>
+                <a:sym typeface="Arial"/>
+              </a:defRPr>
+            </a:lvl2pPr>
+            <a:lvl3pPr marR="0" lvl="2" algn="l" rtl="0">
+              <a:lnSpc>
+                <a:spcPct val="100000"/>
+              </a:lnSpc>
+              <a:spcBef>
+                <a:spcPts val="0"/>
+              </a:spcBef>
+              <a:spcAft>
+                <a:spcPts val="0"/>
+              </a:spcAft>
+              <a:buClr>
+                <a:srgbClr val="000000"/>
+              </a:buClr>
+              <a:buFont typeface="Arial"/>
+              <a:defRPr sz="1400" b="0" i="0" u="none" strike="noStrike" cap="none">
+                <a:solidFill>
+                  <a:srgbClr val="000000"/>
+                </a:solidFill>
+                <a:latin typeface="Arial"/>
+                <a:ea typeface="Arial"/>
+                <a:cs typeface="Arial"/>
+                <a:sym typeface="Arial"/>
+              </a:defRPr>
+            </a:lvl3pPr>
+            <a:lvl4pPr marR="0" lvl="3" algn="l" rtl="0">
+              <a:lnSpc>
+                <a:spcPct val="100000"/>
+              </a:lnSpc>
+              <a:spcBef>
+                <a:spcPts val="0"/>
+              </a:spcBef>
+              <a:spcAft>
+                <a:spcPts val="0"/>
+              </a:spcAft>
+              <a:buClr>
+                <a:srgbClr val="000000"/>
+              </a:buClr>
+              <a:buFont typeface="Arial"/>
+              <a:defRPr sz="1400" b="0" i="0" u="none" strike="noStrike" cap="none">
+                <a:solidFill>
+                  <a:srgbClr val="000000"/>
+                </a:solidFill>
+                <a:latin typeface="Arial"/>
+                <a:ea typeface="Arial"/>
+                <a:cs typeface="Arial"/>
+                <a:sym typeface="Arial"/>
+              </a:defRPr>
+            </a:lvl4pPr>
+            <a:lvl5pPr marR="0" lvl="4" algn="l" rtl="0">
+              <a:lnSpc>
+                <a:spcPct val="100000"/>
+              </a:lnSpc>
+              <a:spcBef>
+                <a:spcPts val="0"/>
+              </a:spcBef>
+              <a:spcAft>
+                <a:spcPts val="0"/>
+              </a:spcAft>
+              <a:buClr>
+                <a:srgbClr val="000000"/>
+              </a:buClr>
+              <a:buFont typeface="Arial"/>
+              <a:defRPr sz="1400" b="0" i="0" u="none" strike="noStrike" cap="none">
+                <a:solidFill>
+                  <a:srgbClr val="000000"/>
+                </a:solidFill>
+                <a:latin typeface="Arial"/>
+                <a:ea typeface="Arial"/>
+                <a:cs typeface="Arial"/>
+                <a:sym typeface="Arial"/>
+              </a:defRPr>
+            </a:lvl5pPr>
+            <a:lvl6pPr marR="0" lvl="5" algn="l" rtl="0">
+              <a:lnSpc>
+                <a:spcPct val="100000"/>
+              </a:lnSpc>
+              <a:spcBef>
+                <a:spcPts val="0"/>
+              </a:spcBef>
+              <a:spcAft>
+                <a:spcPts val="0"/>
+              </a:spcAft>
+              <a:buClr>
+                <a:srgbClr val="000000"/>
+              </a:buClr>
+              <a:buFont typeface="Arial"/>
+              <a:defRPr sz="1400" b="0" i="0" u="none" strike="noStrike" cap="none">
+                <a:solidFill>
+                  <a:srgbClr val="000000"/>
+                </a:solidFill>
+                <a:latin typeface="Arial"/>
+                <a:ea typeface="Arial"/>
+                <a:cs typeface="Arial"/>
+                <a:sym typeface="Arial"/>
+              </a:defRPr>
+            </a:lvl6pPr>
+            <a:lvl7pPr marR="0" lvl="6" algn="l" rtl="0">
+              <a:lnSpc>
+                <a:spcPct val="100000"/>
+              </a:lnSpc>
+              <a:spcBef>
+                <a:spcPts val="0"/>
+              </a:spcBef>
+              <a:spcAft>
+                <a:spcPts val="0"/>
+              </a:spcAft>
+              <a:buClr>
+                <a:srgbClr val="000000"/>
+              </a:buClr>
+              <a:buFont typeface="Arial"/>
+              <a:defRPr sz="1400" b="0" i="0" u="none" strike="noStrike" cap="none">
+                <a:solidFill>
+                  <a:srgbClr val="000000"/>
+                </a:solidFill>
+                <a:latin typeface="Arial"/>
+                <a:ea typeface="Arial"/>
+                <a:cs typeface="Arial"/>
+                <a:sym typeface="Arial"/>
+              </a:defRPr>
+            </a:lvl7pPr>
+            <a:lvl8pPr marR="0" lvl="7" algn="l" rtl="0">
+              <a:lnSpc>
+                <a:spcPct val="100000"/>
+              </a:lnSpc>
+              <a:spcBef>
+                <a:spcPts val="0"/>
+              </a:spcBef>
+              <a:spcAft>
+                <a:spcPts val="0"/>
+              </a:spcAft>
+              <a:buClr>
+                <a:srgbClr val="000000"/>
+              </a:buClr>
+              <a:buFont typeface="Arial"/>
+              <a:defRPr sz="1400" b="0" i="0" u="none" strike="noStrike" cap="none">
+                <a:solidFill>
+                  <a:srgbClr val="000000"/>
+                </a:solidFill>
+                <a:latin typeface="Arial"/>
+                <a:ea typeface="Arial"/>
+                <a:cs typeface="Arial"/>
+                <a:sym typeface="Arial"/>
+              </a:defRPr>
+            </a:lvl8pPr>
+            <a:lvl9pPr marR="0" lvl="8" algn="l" rtl="0">
+              <a:lnSpc>
+                <a:spcPct val="100000"/>
+              </a:lnSpc>
+              <a:spcBef>
+                <a:spcPts val="0"/>
+              </a:spcBef>
+              <a:spcAft>
+                <a:spcPts val="0"/>
+              </a:spcAft>
+              <a:buClr>
+                <a:srgbClr val="000000"/>
+              </a:buClr>
+              <a:buFont typeface="Arial"/>
+              <a:defRPr sz="1400" b="0" i="0" u="none" strike="noStrike" cap="none">
+                <a:solidFill>
+                  <a:srgbClr val="000000"/>
+                </a:solidFill>
+                <a:latin typeface="Arial"/>
+                <a:ea typeface="Arial"/>
+                <a:cs typeface="Arial"/>
+                <a:sym typeface="Arial"/>
+              </a:defRPr>
+            </a:lvl9pPr>
+          </a:lstStyle>
+          <a:p>
+            <a:pPr algn="ctr">
+              <a:lnSpc>
+                <a:spcPct val="90000"/>
+              </a:lnSpc>
+              <a:buClr>
+                <a:schemeClr val="dk1"/>
+              </a:buClr>
+              <a:buSzPts val="4500"/>
+              <a:buFont typeface="Nunito Sans Black"/>
+              <a:buNone/>
+            </a:pPr>
+            <a:r>
+              <a:rPr lang="es-ES" sz="4400" dirty="0" err="1">
+                <a:solidFill>
+                  <a:schemeClr val="bg2"/>
+                </a:solidFill>
+                <a:latin typeface="Squada One" panose="020B0604020202020204" charset="0"/>
+              </a:rPr>
+              <a:t>Agradecimentos</a:t>
+            </a:r>
+            <a:endParaRPr lang="es-ES" sz="4400" dirty="0">
+              <a:solidFill>
+                <a:schemeClr val="bg2"/>
+              </a:solidFill>
+              <a:latin typeface="Squada One" panose="020B0604020202020204" charset="0"/>
+            </a:endParaRPr>
+          </a:p>
+        </p:txBody>
+      </p:sp>
+    </p:spTree>
+    <p:extLst>
+      <p:ext uri="{BB962C8B-B14F-4D97-AF65-F5344CB8AC3E}">
+        <p14:creationId xmlns:p14="http://schemas.microsoft.com/office/powerpoint/2010/main" val="428253977"/>
+      </p:ext>
+    </p:extLst>
+  </p:cSld>
+  <p:clrMapOvr>
+    <a:masterClrMapping/>
+  </p:clrMapOvr>
+</p:sld>
+</file>
+
+<file path=ppt/slides/slide16.xml><?xml version="1.0" encoding="utf-8"?>
 <p:sld xmlns:a="http://schemas.openxmlformats.org/drawingml/2006/main" xmlns:r="http://schemas.openxmlformats.org/officeDocument/2006/relationships" xmlns:p="http://schemas.openxmlformats.org/presentationml/2006/main">
   <p:cSld>
     <p:spTree>
@@ -14753,10 +16376,59 @@
               <a:buNone/>
             </a:pPr>
             <a:r>
-              <a:rPr lang="es-ES" sz="4400" dirty="0" err="1"/>
+              <a:rPr lang="es-ES" sz="4400" dirty="0"/>
               <a:t>Documentação</a:t>
             </a:r>
             <a:endParaRPr sz="4400" b="0" dirty="0"/>
+          </a:p>
+        </p:txBody>
+      </p:sp>
+      <p:sp>
+        <p:nvSpPr>
+          <p:cNvPr id="2" name="Retângulo 1">
+            <a:extLst>
+              <a:ext uri="{FF2B5EF4-FFF2-40B4-BE49-F238E27FC236}">
+                <a16:creationId xmlns:a16="http://schemas.microsoft.com/office/drawing/2014/main" id="{A6F271EE-3E11-40FE-9F7C-8BAFA9EBE591}"/>
+              </a:ext>
+            </a:extLst>
+          </p:cNvPr>
+          <p:cNvSpPr/>
+          <p:nvPr/>
+        </p:nvSpPr>
+        <p:spPr>
+          <a:xfrm>
+            <a:off x="3434316" y="1722473"/>
+            <a:ext cx="1222743" cy="1658679"/>
+          </a:xfrm>
+          <a:prstGeom prst="rect">
+            <a:avLst/>
+          </a:prstGeom>
+          <a:solidFill>
+            <a:schemeClr val="bg1"/>
+          </a:solidFill>
+        </p:spPr>
+        <p:style>
+          <a:lnRef idx="2">
+            <a:schemeClr val="accent1">
+              <a:shade val="50000"/>
+            </a:schemeClr>
+          </a:lnRef>
+          <a:fillRef idx="1">
+            <a:schemeClr val="accent1"/>
+          </a:fillRef>
+          <a:effectRef idx="0">
+            <a:schemeClr val="accent1"/>
+          </a:effectRef>
+          <a:fontRef idx="minor">
+            <a:schemeClr val="lt1"/>
+          </a:fontRef>
+        </p:style>
+        <p:txBody>
+          <a:bodyPr rtlCol="0" anchor="ctr"/>
+          <a:lstStyle/>
+          <a:p>
+            <a:pPr algn="ctr"/>
+            <a:endParaRPr lang="pt-BR"/>
           </a:p>
         </p:txBody>
       </p:sp>
@@ -15395,11 +17067,7 @@
             </a:pPr>
             <a:r>
               <a:rPr lang="es-ES" sz="4400" b="0" dirty="0"/>
-              <a:t>Modelage</a:t>
-            </a:r>
-            <a:r>
-              <a:rPr lang="es-ES" sz="4400" dirty="0"/>
-              <a:t>m</a:t>
+              <a:t>Banco de Dados</a:t>
             </a:r>
             <a:endParaRPr sz="4400" b="0" dirty="0"/>
           </a:p>
@@ -15465,12 +17133,296 @@
           <a:chExt cx="0" cy="0"/>
         </a:xfrm>
       </p:grpSpPr>
+      <p:sp>
+        <p:nvSpPr>
+          <p:cNvPr id="3" name="Google Shape;325;p33">
+            <a:extLst>
+              <a:ext uri="{FF2B5EF4-FFF2-40B4-BE49-F238E27FC236}">
+                <a16:creationId xmlns:a16="http://schemas.microsoft.com/office/drawing/2014/main" id="{73099660-EC31-49B2-BA62-164AB6464B8B}"/>
+              </a:ext>
+            </a:extLst>
+          </p:cNvPr>
+          <p:cNvSpPr txBox="1">
+            <a:spLocks/>
+          </p:cNvSpPr>
+          <p:nvPr/>
+        </p:nvSpPr>
+        <p:spPr>
+          <a:xfrm>
+            <a:off x="919824" y="563526"/>
+            <a:ext cx="6634500" cy="677874"/>
+          </a:xfrm>
+          <a:prstGeom prst="rect">
+            <a:avLst/>
+          </a:prstGeom>
+          <a:noFill/>
+          <a:ln>
+            <a:noFill/>
+          </a:ln>
+        </p:spPr>
+        <p:txBody>
+          <a:bodyPr spcFirstLastPara="1" wrap="square" lIns="68575" tIns="34275" rIns="68575" bIns="34275" anchor="b" anchorCtr="0">
+            <a:noAutofit/>
+          </a:bodyPr>
+          <a:lstStyle>
+            <a:defPPr marR="0" lvl="0" algn="l" rtl="0">
+              <a:lnSpc>
+                <a:spcPct val="100000"/>
+              </a:lnSpc>
+              <a:spcBef>
+                <a:spcPts val="0"/>
+              </a:spcBef>
+              <a:spcAft>
+                <a:spcPts val="0"/>
+              </a:spcAft>
+            </a:defPPr>
+            <a:lvl1pPr marR="0" lvl="0" algn="l" rtl="0">
+              <a:lnSpc>
+                <a:spcPct val="100000"/>
+              </a:lnSpc>
+              <a:spcBef>
+                <a:spcPts val="0"/>
+              </a:spcBef>
+              <a:spcAft>
+                <a:spcPts val="0"/>
+              </a:spcAft>
+              <a:buClr>
+                <a:srgbClr val="000000"/>
+              </a:buClr>
+              <a:buFont typeface="Arial"/>
+              <a:defRPr sz="1400" b="0" i="0" u="none" strike="noStrike" cap="none">
+                <a:solidFill>
+                  <a:srgbClr val="000000"/>
+                </a:solidFill>
+                <a:latin typeface="Arial"/>
+                <a:ea typeface="Arial"/>
+                <a:cs typeface="Arial"/>
+                <a:sym typeface="Arial"/>
+              </a:defRPr>
+            </a:lvl1pPr>
+            <a:lvl2pPr marR="0" lvl="1" algn="l" rtl="0">
+              <a:lnSpc>
+                <a:spcPct val="100000"/>
+              </a:lnSpc>
+              <a:spcBef>
+                <a:spcPts val="0"/>
+              </a:spcBef>
+              <a:spcAft>
+                <a:spcPts val="0"/>
+              </a:spcAft>
+              <a:buClr>
+                <a:srgbClr val="000000"/>
+              </a:buClr>
+              <a:buFont typeface="Arial"/>
+              <a:defRPr sz="1400" b="0" i="0" u="none" strike="noStrike" cap="none">
+                <a:solidFill>
+                  <a:srgbClr val="000000"/>
+                </a:solidFill>
+                <a:latin typeface="Arial"/>
+                <a:ea typeface="Arial"/>
+                <a:cs typeface="Arial"/>
+                <a:sym typeface="Arial"/>
+              </a:defRPr>
+            </a:lvl2pPr>
+            <a:lvl3pPr marR="0" lvl="2" algn="l" rtl="0">
+              <a:lnSpc>
+                <a:spcPct val="100000"/>
+              </a:lnSpc>
+              <a:spcBef>
+                <a:spcPts val="0"/>
+              </a:spcBef>
+              <a:spcAft>
+                <a:spcPts val="0"/>
+              </a:spcAft>
+              <a:buClr>
+                <a:srgbClr val="000000"/>
+              </a:buClr>
+              <a:buFont typeface="Arial"/>
+              <a:defRPr sz="1400" b="0" i="0" u="none" strike="noStrike" cap="none">
+                <a:solidFill>
+                  <a:srgbClr val="000000"/>
+                </a:solidFill>
+                <a:latin typeface="Arial"/>
+                <a:ea typeface="Arial"/>
+                <a:cs typeface="Arial"/>
+                <a:sym typeface="Arial"/>
+              </a:defRPr>
+            </a:lvl3pPr>
+            <a:lvl4pPr marR="0" lvl="3" algn="l" rtl="0">
+              <a:lnSpc>
+                <a:spcPct val="100000"/>
+              </a:lnSpc>
+              <a:spcBef>
+                <a:spcPts val="0"/>
+              </a:spcBef>
+              <a:spcAft>
+                <a:spcPts val="0"/>
+              </a:spcAft>
+              <a:buClr>
+                <a:srgbClr val="000000"/>
+              </a:buClr>
+              <a:buFont typeface="Arial"/>
+              <a:defRPr sz="1400" b="0" i="0" u="none" strike="noStrike" cap="none">
+                <a:solidFill>
+                  <a:srgbClr val="000000"/>
+                </a:solidFill>
+                <a:latin typeface="Arial"/>
+                <a:ea typeface="Arial"/>
+                <a:cs typeface="Arial"/>
+                <a:sym typeface="Arial"/>
+              </a:defRPr>
+            </a:lvl4pPr>
+            <a:lvl5pPr marR="0" lvl="4" algn="l" rtl="0">
+              <a:lnSpc>
+                <a:spcPct val="100000"/>
+              </a:lnSpc>
+              <a:spcBef>
+                <a:spcPts val="0"/>
+              </a:spcBef>
+              <a:spcAft>
+                <a:spcPts val="0"/>
+              </a:spcAft>
+              <a:buClr>
+                <a:srgbClr val="000000"/>
+              </a:buClr>
+              <a:buFont typeface="Arial"/>
+              <a:defRPr sz="1400" b="0" i="0" u="none" strike="noStrike" cap="none">
+                <a:solidFill>
+                  <a:srgbClr val="000000"/>
+                </a:solidFill>
+                <a:latin typeface="Arial"/>
+                <a:ea typeface="Arial"/>
+                <a:cs typeface="Arial"/>
+                <a:sym typeface="Arial"/>
+              </a:defRPr>
+            </a:lvl5pPr>
+            <a:lvl6pPr marR="0" lvl="5" algn="l" rtl="0">
+              <a:lnSpc>
+                <a:spcPct val="100000"/>
+              </a:lnSpc>
+              <a:spcBef>
+                <a:spcPts val="0"/>
+              </a:spcBef>
+              <a:spcAft>
+                <a:spcPts val="0"/>
+              </a:spcAft>
+              <a:buClr>
+                <a:srgbClr val="000000"/>
+              </a:buClr>
+              <a:buFont typeface="Arial"/>
+              <a:defRPr sz="1400" b="0" i="0" u="none" strike="noStrike" cap="none">
+                <a:solidFill>
+                  <a:srgbClr val="000000"/>
+                </a:solidFill>
+                <a:latin typeface="Arial"/>
+                <a:ea typeface="Arial"/>
+                <a:cs typeface="Arial"/>
+                <a:sym typeface="Arial"/>
+              </a:defRPr>
+            </a:lvl6pPr>
+            <a:lvl7pPr marR="0" lvl="6" algn="l" rtl="0">
+              <a:lnSpc>
+                <a:spcPct val="100000"/>
+              </a:lnSpc>
+              <a:spcBef>
+                <a:spcPts val="0"/>
+              </a:spcBef>
+              <a:spcAft>
+                <a:spcPts val="0"/>
+              </a:spcAft>
+              <a:buClr>
+                <a:srgbClr val="000000"/>
+              </a:buClr>
+              <a:buFont typeface="Arial"/>
+              <a:defRPr sz="1400" b="0" i="0" u="none" strike="noStrike" cap="none">
+                <a:solidFill>
+                  <a:srgbClr val="000000"/>
+                </a:solidFill>
+                <a:latin typeface="Arial"/>
+                <a:ea typeface="Arial"/>
+                <a:cs typeface="Arial"/>
+                <a:sym typeface="Arial"/>
+              </a:defRPr>
+            </a:lvl7pPr>
+            <a:lvl8pPr marR="0" lvl="7" algn="l" rtl="0">
+              <a:lnSpc>
+                <a:spcPct val="100000"/>
+              </a:lnSpc>
+              <a:spcBef>
+                <a:spcPts val="0"/>
+              </a:spcBef>
+              <a:spcAft>
+                <a:spcPts val="0"/>
+              </a:spcAft>
+              <a:buClr>
+                <a:srgbClr val="000000"/>
+              </a:buClr>
+              <a:buFont typeface="Arial"/>
+              <a:defRPr sz="1400" b="0" i="0" u="none" strike="noStrike" cap="none">
+                <a:solidFill>
+                  <a:srgbClr val="000000"/>
+                </a:solidFill>
+                <a:latin typeface="Arial"/>
+                <a:ea typeface="Arial"/>
+                <a:cs typeface="Arial"/>
+                <a:sym typeface="Arial"/>
+              </a:defRPr>
+            </a:lvl8pPr>
+            <a:lvl9pPr marR="0" lvl="8" algn="l" rtl="0">
+              <a:lnSpc>
+                <a:spcPct val="100000"/>
+              </a:lnSpc>
+              <a:spcBef>
+                <a:spcPts val="0"/>
+              </a:spcBef>
+              <a:spcAft>
+                <a:spcPts val="0"/>
+              </a:spcAft>
+              <a:buClr>
+                <a:srgbClr val="000000"/>
+              </a:buClr>
+              <a:buFont typeface="Arial"/>
+              <a:defRPr sz="1400" b="0" i="0" u="none" strike="noStrike" cap="none">
+                <a:solidFill>
+                  <a:srgbClr val="000000"/>
+                </a:solidFill>
+                <a:latin typeface="Arial"/>
+                <a:ea typeface="Arial"/>
+                <a:cs typeface="Arial"/>
+                <a:sym typeface="Arial"/>
+              </a:defRPr>
+            </a:lvl9pPr>
+          </a:lstStyle>
+          <a:p>
+            <a:pPr algn="ctr">
+              <a:lnSpc>
+                <a:spcPct val="90000"/>
+              </a:lnSpc>
+              <a:buClr>
+                <a:schemeClr val="dk1"/>
+              </a:buClr>
+              <a:buSzPts val="4500"/>
+              <a:buFont typeface="Nunito Sans Black"/>
+              <a:buNone/>
+            </a:pPr>
+            <a:r>
+              <a:rPr lang="es-ES" sz="5400" dirty="0">
+                <a:solidFill>
+                  <a:schemeClr val="bg2"/>
+                </a:solidFill>
+                <a:latin typeface="Squada One" panose="020B0604020202020204" charset="0"/>
+              </a:rPr>
+              <a:t>Modelagem</a:t>
+            </a:r>
+          </a:p>
+        </p:txBody>
+      </p:sp>
       <p:pic>
         <p:nvPicPr>
-          <p:cNvPr id="6" name="Imagem 5">
+          <p:cNvPr id="4" name="Imagem 3">
             <a:extLst>
               <a:ext uri="{FF2B5EF4-FFF2-40B4-BE49-F238E27FC236}">
-                <a16:creationId xmlns:a16="http://schemas.microsoft.com/office/drawing/2014/main" id="{13C4AEA0-D798-4357-875C-77CEEA0F99B3}"/>
+                <a16:creationId xmlns:a16="http://schemas.microsoft.com/office/drawing/2014/main" id="{356FB0CD-2AF7-4EC2-A31B-F3B1031795C2}"/>
               </a:ext>
             </a:extLst>
           </p:cNvPr>
@@ -15487,8 +17439,8 @@
         </p:blipFill>
         <p:spPr>
           <a:xfrm>
-            <a:off x="1343685" y="974097"/>
-            <a:ext cx="6456629" cy="3195305"/>
+            <a:off x="2233612" y="1503399"/>
+            <a:ext cx="4676775" cy="3076575"/>
           </a:xfrm>
           <a:prstGeom prst="rect">
             <a:avLst/>
@@ -15513,7 +17465,7 @@
   <p:cSld>
     <p:spTree>
       <p:nvGrpSpPr>
-        <p:cNvPr id="1" name="Shape 324"/>
+        <p:cNvPr id="1" name="Shape 347"/>
         <p:cNvGrpSpPr/>
         <p:nvPr/>
       </p:nvGrpSpPr>
@@ -15525,15 +17477,49 @@
           <a:chExt cx="0" cy="0"/>
         </a:xfrm>
       </p:grpSpPr>
+      <p:pic>
+        <p:nvPicPr>
+          <p:cNvPr id="3" name="Imagem 2">
+            <a:extLst>
+              <a:ext uri="{FF2B5EF4-FFF2-40B4-BE49-F238E27FC236}">
+                <a16:creationId xmlns:a16="http://schemas.microsoft.com/office/drawing/2014/main" id="{52556F04-1B7F-4061-ACD2-D5F7F5D15E15}"/>
+              </a:ext>
+            </a:extLst>
+          </p:cNvPr>
+          <p:cNvPicPr>
+            <a:picLocks noChangeAspect="1"/>
+          </p:cNvPicPr>
+          <p:nvPr/>
+        </p:nvPicPr>
+        <p:blipFill>
+          <a:blip r:embed="rId3"/>
+          <a:stretch>
+            <a:fillRect/>
+          </a:stretch>
+        </p:blipFill>
+        <p:spPr>
+          <a:xfrm>
+            <a:off x="1384115" y="1542052"/>
+            <a:ext cx="6375769" cy="3191188"/>
+          </a:xfrm>
+          <a:prstGeom prst="rect">
+            <a:avLst/>
+          </a:prstGeom>
+        </p:spPr>
+      </p:pic>
       <p:sp>
         <p:nvSpPr>
-          <p:cNvPr id="325" name="Google Shape;325;p33"/>
+          <p:cNvPr id="7" name="Google Shape;325;p33">
+            <a:extLst>
+              <a:ext uri="{FF2B5EF4-FFF2-40B4-BE49-F238E27FC236}">
+                <a16:creationId xmlns:a16="http://schemas.microsoft.com/office/drawing/2014/main" id="{B8E8687A-CA58-417A-8418-DB13040BEBA1}"/>
+              </a:ext>
+            </a:extLst>
+          </p:cNvPr>
           <p:cNvSpPr txBox="1">
-            <a:spLocks noGrp="1"/>
+            <a:spLocks/>
           </p:cNvSpPr>
-          <p:nvPr>
-            <p:ph type="ctrTitle"/>
-          </p:nvPr>
+          <p:nvPr/>
         </p:nvSpPr>
         <p:spPr>
           <a:xfrm>
@@ -15552,18 +17538,240 @@
           <a:bodyPr spcFirstLastPara="1" wrap="square" lIns="68575" tIns="34275" rIns="68575" bIns="34275" anchor="b" anchorCtr="0">
             <a:noAutofit/>
           </a:bodyPr>
-          <a:lstStyle/>
+          <a:lstStyle>
+            <a:defPPr marR="0" lvl="0" algn="l" rtl="0">
+              <a:lnSpc>
+                <a:spcPct val="100000"/>
+              </a:lnSpc>
+              <a:spcBef>
+                <a:spcPts val="0"/>
+              </a:spcBef>
+              <a:spcAft>
+                <a:spcPts val="0"/>
+              </a:spcAft>
+            </a:defPPr>
+            <a:lvl1pPr marR="0" lvl="0" algn="l" rtl="0">
+              <a:lnSpc>
+                <a:spcPct val="100000"/>
+              </a:lnSpc>
+              <a:spcBef>
+                <a:spcPts val="0"/>
+              </a:spcBef>
+              <a:spcAft>
+                <a:spcPts val="0"/>
+              </a:spcAft>
+              <a:buClr>
+                <a:srgbClr val="000000"/>
+              </a:buClr>
+              <a:buFont typeface="Arial"/>
+              <a:defRPr sz="1400" b="0" i="0" u="none" strike="noStrike" cap="none">
+                <a:solidFill>
+                  <a:srgbClr val="000000"/>
+                </a:solidFill>
+                <a:latin typeface="Arial"/>
+                <a:ea typeface="Arial"/>
+                <a:cs typeface="Arial"/>
+                <a:sym typeface="Arial"/>
+              </a:defRPr>
+            </a:lvl1pPr>
+            <a:lvl2pPr marR="0" lvl="1" algn="l" rtl="0">
+              <a:lnSpc>
+                <a:spcPct val="100000"/>
+              </a:lnSpc>
+              <a:spcBef>
+                <a:spcPts val="0"/>
+              </a:spcBef>
+              <a:spcAft>
+                <a:spcPts val="0"/>
+              </a:spcAft>
+              <a:buClr>
+                <a:srgbClr val="000000"/>
+              </a:buClr>
+              <a:buFont typeface="Arial"/>
+              <a:defRPr sz="1400" b="0" i="0" u="none" strike="noStrike" cap="none">
+                <a:solidFill>
+                  <a:srgbClr val="000000"/>
+                </a:solidFill>
+                <a:latin typeface="Arial"/>
+                <a:ea typeface="Arial"/>
+                <a:cs typeface="Arial"/>
+                <a:sym typeface="Arial"/>
+              </a:defRPr>
+            </a:lvl2pPr>
+            <a:lvl3pPr marR="0" lvl="2" algn="l" rtl="0">
+              <a:lnSpc>
+                <a:spcPct val="100000"/>
+              </a:lnSpc>
+              <a:spcBef>
+                <a:spcPts val="0"/>
+              </a:spcBef>
+              <a:spcAft>
+                <a:spcPts val="0"/>
+              </a:spcAft>
+              <a:buClr>
+                <a:srgbClr val="000000"/>
+              </a:buClr>
+              <a:buFont typeface="Arial"/>
+              <a:defRPr sz="1400" b="0" i="0" u="none" strike="noStrike" cap="none">
+                <a:solidFill>
+                  <a:srgbClr val="000000"/>
+                </a:solidFill>
+                <a:latin typeface="Arial"/>
+                <a:ea typeface="Arial"/>
+                <a:cs typeface="Arial"/>
+                <a:sym typeface="Arial"/>
+              </a:defRPr>
+            </a:lvl3pPr>
+            <a:lvl4pPr marR="0" lvl="3" algn="l" rtl="0">
+              <a:lnSpc>
+                <a:spcPct val="100000"/>
+              </a:lnSpc>
+              <a:spcBef>
+                <a:spcPts val="0"/>
+              </a:spcBef>
+              <a:spcAft>
+                <a:spcPts val="0"/>
+              </a:spcAft>
+              <a:buClr>
+                <a:srgbClr val="000000"/>
+              </a:buClr>
+              <a:buFont typeface="Arial"/>
+              <a:defRPr sz="1400" b="0" i="0" u="none" strike="noStrike" cap="none">
+                <a:solidFill>
+                  <a:srgbClr val="000000"/>
+                </a:solidFill>
+                <a:latin typeface="Arial"/>
+                <a:ea typeface="Arial"/>
+                <a:cs typeface="Arial"/>
+                <a:sym typeface="Arial"/>
+              </a:defRPr>
+            </a:lvl4pPr>
+            <a:lvl5pPr marR="0" lvl="4" algn="l" rtl="0">
+              <a:lnSpc>
+                <a:spcPct val="100000"/>
+              </a:lnSpc>
+              <a:spcBef>
+                <a:spcPts val="0"/>
+              </a:spcBef>
+              <a:spcAft>
+                <a:spcPts val="0"/>
+              </a:spcAft>
+              <a:buClr>
+                <a:srgbClr val="000000"/>
+              </a:buClr>
+              <a:buFont typeface="Arial"/>
+              <a:defRPr sz="1400" b="0" i="0" u="none" strike="noStrike" cap="none">
+                <a:solidFill>
+                  <a:srgbClr val="000000"/>
+                </a:solidFill>
+                <a:latin typeface="Arial"/>
+                <a:ea typeface="Arial"/>
+                <a:cs typeface="Arial"/>
+                <a:sym typeface="Arial"/>
+              </a:defRPr>
+            </a:lvl5pPr>
+            <a:lvl6pPr marR="0" lvl="5" algn="l" rtl="0">
+              <a:lnSpc>
+                <a:spcPct val="100000"/>
+              </a:lnSpc>
+              <a:spcBef>
+                <a:spcPts val="0"/>
+              </a:spcBef>
+              <a:spcAft>
+                <a:spcPts val="0"/>
+              </a:spcAft>
+              <a:buClr>
+                <a:srgbClr val="000000"/>
+              </a:buClr>
+              <a:buFont typeface="Arial"/>
+              <a:defRPr sz="1400" b="0" i="0" u="none" strike="noStrike" cap="none">
+                <a:solidFill>
+                  <a:srgbClr val="000000"/>
+                </a:solidFill>
+                <a:latin typeface="Arial"/>
+                <a:ea typeface="Arial"/>
+                <a:cs typeface="Arial"/>
+                <a:sym typeface="Arial"/>
+              </a:defRPr>
+            </a:lvl6pPr>
+            <a:lvl7pPr marR="0" lvl="6" algn="l" rtl="0">
+              <a:lnSpc>
+                <a:spcPct val="100000"/>
+              </a:lnSpc>
+              <a:spcBef>
+                <a:spcPts val="0"/>
+              </a:spcBef>
+              <a:spcAft>
+                <a:spcPts val="0"/>
+              </a:spcAft>
+              <a:buClr>
+                <a:srgbClr val="000000"/>
+              </a:buClr>
+              <a:buFont typeface="Arial"/>
+              <a:defRPr sz="1400" b="0" i="0" u="none" strike="noStrike" cap="none">
+                <a:solidFill>
+                  <a:srgbClr val="000000"/>
+                </a:solidFill>
+                <a:latin typeface="Arial"/>
+                <a:ea typeface="Arial"/>
+                <a:cs typeface="Arial"/>
+                <a:sym typeface="Arial"/>
+              </a:defRPr>
+            </a:lvl7pPr>
+            <a:lvl8pPr marR="0" lvl="7" algn="l" rtl="0">
+              <a:lnSpc>
+                <a:spcPct val="100000"/>
+              </a:lnSpc>
+              <a:spcBef>
+                <a:spcPts val="0"/>
+              </a:spcBef>
+              <a:spcAft>
+                <a:spcPts val="0"/>
+              </a:spcAft>
+              <a:buClr>
+                <a:srgbClr val="000000"/>
+              </a:buClr>
+              <a:buFont typeface="Arial"/>
+              <a:defRPr sz="1400" b="0" i="0" u="none" strike="noStrike" cap="none">
+                <a:solidFill>
+                  <a:srgbClr val="000000"/>
+                </a:solidFill>
+                <a:latin typeface="Arial"/>
+                <a:ea typeface="Arial"/>
+                <a:cs typeface="Arial"/>
+                <a:sym typeface="Arial"/>
+              </a:defRPr>
+            </a:lvl8pPr>
+            <a:lvl9pPr marR="0" lvl="8" algn="l" rtl="0">
+              <a:lnSpc>
+                <a:spcPct val="100000"/>
+              </a:lnSpc>
+              <a:spcBef>
+                <a:spcPts val="0"/>
+              </a:spcBef>
+              <a:spcAft>
+                <a:spcPts val="0"/>
+              </a:spcAft>
+              <a:buClr>
+                <a:srgbClr val="000000"/>
+              </a:buClr>
+              <a:buFont typeface="Arial"/>
+              <a:defRPr sz="1400" b="0" i="0" u="none" strike="noStrike" cap="none">
+                <a:solidFill>
+                  <a:srgbClr val="000000"/>
+                </a:solidFill>
+                <a:latin typeface="Arial"/>
+                <a:ea typeface="Arial"/>
+                <a:cs typeface="Arial"/>
+                <a:sym typeface="Arial"/>
+              </a:defRPr>
+            </a:lvl9pPr>
+          </a:lstStyle>
           <a:p>
-            <a:pPr marL="0" lvl="0" indent="0" algn="ctr" rtl="0">
+            <a:pPr algn="ctr">
               <a:lnSpc>
                 <a:spcPct val="90000"/>
               </a:lnSpc>
-              <a:spcBef>
-                <a:spcPts val="0"/>
-              </a:spcBef>
-              <a:spcAft>
-                <a:spcPts val="0"/>
-              </a:spcAft>
               <a:buClr>
                 <a:schemeClr val="dk1"/>
               </a:buClr>
@@ -15572,17 +17780,21 @@
               <a:buNone/>
             </a:pPr>
             <a:r>
-              <a:rPr lang="es-ES" sz="4400" b="0" dirty="0"/>
-              <a:t>Site</a:t>
+              <a:rPr lang="es-ES" sz="5400" dirty="0">
+                <a:solidFill>
+                  <a:schemeClr val="bg2"/>
+                </a:solidFill>
+                <a:latin typeface="Squada One" panose="020B0604020202020204" charset="0"/>
+              </a:rPr>
+              <a:t>Script</a:t>
             </a:r>
-            <a:endParaRPr sz="4400" b="0" dirty="0"/>
           </a:p>
         </p:txBody>
       </p:sp>
     </p:spTree>
     <p:extLst>
       <p:ext uri="{BB962C8B-B14F-4D97-AF65-F5344CB8AC3E}">
-        <p14:creationId xmlns:p14="http://schemas.microsoft.com/office/powerpoint/2010/main" val="1892733896"/>
+        <p14:creationId xmlns:p14="http://schemas.microsoft.com/office/powerpoint/2010/main" val="374242088"/>
       </p:ext>
     </p:extLst>
   </p:cSld>

</xml_diff>